<commit_message>
added git clone command
</commit_message>
<xml_diff>
--- a/Evolution_of_GIT.pptx
+++ b/Evolution_of_GIT.pptx
@@ -3024,7 +3024,15 @@
           <a:p>
             <a:r>
               <a:rPr lang="en-US" dirty="0" smtClean="0"/>
-              <a:t>Who ? 	Linux Torvalds (Invented Linux)</a:t>
+              <a:t>Who ? 	</a:t>
+            </a:r>
+            <a:r>
+              <a:rPr lang="en-US" smtClean="0"/>
+              <a:t>Linus </a:t>
+            </a:r>
+            <a:r>
+              <a:rPr lang="en-US" dirty="0" smtClean="0"/>
+              <a:t>Torvalds (Invented Linux)</a:t>
             </a:r>
           </a:p>
           <a:p>

</xml_diff>